<commit_message>
Show more examples of image resizing
</commit_message>
<xml_diff>
--- a/demo/src/main/resources/template.pptx
+++ b/demo/src/main/resources/template.pptx
@@ -289,7 +289,7 @@
             <a:fld id="{3FD446A4-B7F7-4EA6-B2D1-ED8943CD3043}" type="datetimeFigureOut">
               <a:rPr lang="fr-FR" smtClean="0"/>
               <a:pPr/>
-              <a:t>12/12/2016</a:t>
+              <a:t>19/12/2016</a:t>
             </a:fld>
             <a:endParaRPr lang="fr-FR"/>
           </a:p>
@@ -456,7 +456,7 @@
             <a:fld id="{3FD446A4-B7F7-4EA6-B2D1-ED8943CD3043}" type="datetimeFigureOut">
               <a:rPr lang="fr-FR" smtClean="0"/>
               <a:pPr/>
-              <a:t>12/12/2016</a:t>
+              <a:t>19/12/2016</a:t>
             </a:fld>
             <a:endParaRPr lang="fr-FR"/>
           </a:p>
@@ -633,7 +633,7 @@
             <a:fld id="{3FD446A4-B7F7-4EA6-B2D1-ED8943CD3043}" type="datetimeFigureOut">
               <a:rPr lang="fr-FR" smtClean="0"/>
               <a:pPr/>
-              <a:t>12/12/2016</a:t>
+              <a:t>19/12/2016</a:t>
             </a:fld>
             <a:endParaRPr lang="fr-FR"/>
           </a:p>
@@ -800,7 +800,7 @@
             <a:fld id="{3FD446A4-B7F7-4EA6-B2D1-ED8943CD3043}" type="datetimeFigureOut">
               <a:rPr lang="fr-FR" smtClean="0"/>
               <a:pPr/>
-              <a:t>12/12/2016</a:t>
+              <a:t>19/12/2016</a:t>
             </a:fld>
             <a:endParaRPr lang="fr-FR"/>
           </a:p>
@@ -1043,7 +1043,7 @@
             <a:fld id="{3FD446A4-B7F7-4EA6-B2D1-ED8943CD3043}" type="datetimeFigureOut">
               <a:rPr lang="fr-FR" smtClean="0"/>
               <a:pPr/>
-              <a:t>12/12/2016</a:t>
+              <a:t>19/12/2016</a:t>
             </a:fld>
             <a:endParaRPr lang="fr-FR"/>
           </a:p>
@@ -1328,7 +1328,7 @@
             <a:fld id="{3FD446A4-B7F7-4EA6-B2D1-ED8943CD3043}" type="datetimeFigureOut">
               <a:rPr lang="fr-FR" smtClean="0"/>
               <a:pPr/>
-              <a:t>12/12/2016</a:t>
+              <a:t>19/12/2016</a:t>
             </a:fld>
             <a:endParaRPr lang="fr-FR"/>
           </a:p>
@@ -1747,7 +1747,7 @@
             <a:fld id="{3FD446A4-B7F7-4EA6-B2D1-ED8943CD3043}" type="datetimeFigureOut">
               <a:rPr lang="fr-FR" smtClean="0"/>
               <a:pPr/>
-              <a:t>12/12/2016</a:t>
+              <a:t>19/12/2016</a:t>
             </a:fld>
             <a:endParaRPr lang="fr-FR"/>
           </a:p>
@@ -1862,7 +1862,7 @@
             <a:fld id="{3FD446A4-B7F7-4EA6-B2D1-ED8943CD3043}" type="datetimeFigureOut">
               <a:rPr lang="fr-FR" smtClean="0"/>
               <a:pPr/>
-              <a:t>12/12/2016</a:t>
+              <a:t>19/12/2016</a:t>
             </a:fld>
             <a:endParaRPr lang="fr-FR"/>
           </a:p>
@@ -1954,7 +1954,7 @@
             <a:fld id="{3FD446A4-B7F7-4EA6-B2D1-ED8943CD3043}" type="datetimeFigureOut">
               <a:rPr lang="fr-FR" smtClean="0"/>
               <a:pPr/>
-              <a:t>12/12/2016</a:t>
+              <a:t>19/12/2016</a:t>
             </a:fld>
             <a:endParaRPr lang="fr-FR"/>
           </a:p>
@@ -2228,7 +2228,7 @@
             <a:fld id="{3FD446A4-B7F7-4EA6-B2D1-ED8943CD3043}" type="datetimeFigureOut">
               <a:rPr lang="fr-FR" smtClean="0"/>
               <a:pPr/>
-              <a:t>12/12/2016</a:t>
+              <a:t>19/12/2016</a:t>
             </a:fld>
             <a:endParaRPr lang="fr-FR"/>
           </a:p>
@@ -2478,7 +2478,7 @@
             <a:fld id="{3FD446A4-B7F7-4EA6-B2D1-ED8943CD3043}" type="datetimeFigureOut">
               <a:rPr lang="fr-FR" smtClean="0"/>
               <a:pPr/>
-              <a:t>12/12/2016</a:t>
+              <a:t>19/12/2016</a:t>
             </a:fld>
             <a:endParaRPr lang="fr-FR"/>
           </a:p>
@@ -2688,7 +2688,7 @@
             <a:fld id="{3FD446A4-B7F7-4EA6-B2D1-ED8943CD3043}" type="datetimeFigureOut">
               <a:rPr lang="fr-FR" smtClean="0"/>
               <a:pPr/>
-              <a:t>12/12/2016</a:t>
+              <a:t>19/12/2016</a:t>
             </a:fld>
             <a:endParaRPr lang="fr-FR"/>
           </a:p>
@@ -3062,7 +3062,7 @@
       <p:pic>
         <p:nvPicPr>
           <p:cNvPr id="1026" name="Picture 2" descr="D:\workspaces\unibail_turan\ppt-template\src\test\resources\images\150x400.png">
-            <a:hlinkClick r:id="rId2" action="ppaction://hlinkfile"/>
+            <a:hlinkClick r:id="rId2"/>
           </p:cNvPr>
           <p:cNvPicPr>
             <a:picLocks noChangeAspect="1" noChangeArrowheads="1"/>
@@ -3118,7 +3118,7 @@
       <p:pic>
         <p:nvPicPr>
           <p:cNvPr id="1028" name="Picture 4" descr="D:\workspaces\unibail_turan\ppt-template\src\test\resources\images\500x300.png">
-            <a:hlinkClick r:id="rId2" action="ppaction://hlinkfile"/>
+            <a:hlinkClick r:id="rId6"/>
           </p:cNvPr>
           <p:cNvPicPr>
             <a:picLocks noChangeAspect="1" noChangeArrowheads="1"/>
@@ -3126,7 +3126,7 @@
           <p:nvPr/>
         </p:nvPicPr>
         <p:blipFill>
-          <a:blip r:embed="rId6" cstate="print"/>
+          <a:blip r:embed="rId7" cstate="print"/>
           <a:srcRect/>
           <a:stretch>
             <a:fillRect/>
@@ -3152,7 +3152,7 @@
         <p:spPr>
           <a:xfrm>
             <a:off x="3563888" y="1268760"/>
-            <a:ext cx="1728192" cy="1200329"/>
+            <a:ext cx="1728192" cy="4524315"/>
           </a:xfrm>
           <a:prstGeom prst="rect">
             <a:avLst/>
@@ -3174,7 +3174,7 @@
           <a:p>
             <a:r>
               <a:rPr lang="fr-FR" dirty="0" smtClean="0">
-                <a:hlinkClick r:id="rId7"/>
+                <a:hlinkClick r:id="rId8"/>
               </a:rPr>
               <a:t>$/var1/</a:t>
             </a:r>
@@ -3191,17 +3191,110 @@
           </a:p>
           <a:p>
             <a:r>
+              <a:rPr lang="fr-FR" dirty="0" smtClean="0">
+                <a:hlinkClick r:id="rId4"/>
+              </a:rPr>
+              <a:t>$/var2/</a:t>
+            </a:r>
+            <a:endParaRPr lang="fr-FR" dirty="0" smtClean="0"/>
+          </a:p>
+          <a:p>
+            <a:r>
+              <a:rPr lang="fr-FR" dirty="0" smtClean="0">
+                <a:hlinkClick r:id="rId4"/>
+              </a:rPr>
+              <a:t>$/var2/</a:t>
+            </a:r>
+            <a:endParaRPr lang="fr-FR" dirty="0" smtClean="0"/>
+          </a:p>
+          <a:p>
+            <a:r>
+              <a:rPr lang="fr-FR" dirty="0" smtClean="0">
+                <a:hlinkClick r:id="rId4"/>
+              </a:rPr>
+              <a:t>$/var2/</a:t>
+            </a:r>
+            <a:endParaRPr lang="fr-FR" dirty="0" smtClean="0"/>
+          </a:p>
+          <a:p>
+            <a:r>
+              <a:rPr lang="fr-FR" dirty="0" smtClean="0">
+                <a:hlinkClick r:id="rId4"/>
+              </a:rPr>
+              <a:t>$/var2/</a:t>
+            </a:r>
+            <a:endParaRPr lang="fr-FR" dirty="0" smtClean="0"/>
+          </a:p>
+          <a:p>
+            <a:r>
+              <a:rPr lang="fr-FR" dirty="0" smtClean="0">
+                <a:hlinkClick r:id="rId4"/>
+              </a:rPr>
+              <a:t>$/var2/</a:t>
+            </a:r>
+            <a:endParaRPr lang="fr-FR" dirty="0" smtClean="0"/>
+          </a:p>
+          <a:p>
+            <a:r>
+              <a:rPr lang="fr-FR" dirty="0" smtClean="0">
+                <a:hlinkClick r:id="rId4"/>
+              </a:rPr>
+              <a:t>$/var2/</a:t>
+            </a:r>
+            <a:endParaRPr lang="fr-FR" dirty="0" smtClean="0"/>
+          </a:p>
+          <a:p>
+            <a:endParaRPr lang="fr-FR" dirty="0" smtClean="0"/>
+          </a:p>
+          <a:p>
+            <a:r>
               <a:rPr lang="fr-FR" dirty="0" err="1" smtClean="0"/>
               <a:t>Text</a:t>
             </a:r>
             <a:endParaRPr lang="fr-FR" dirty="0" smtClean="0"/>
           </a:p>
+          <a:p>
+            <a:r>
+              <a:rPr lang="fr-FR" dirty="0" smtClean="0">
+                <a:hlinkClick r:id="rId4"/>
+              </a:rPr>
+              <a:t>$/var2/</a:t>
+            </a:r>
+            <a:endParaRPr lang="fr-FR" dirty="0" smtClean="0"/>
+          </a:p>
+          <a:p>
+            <a:r>
+              <a:rPr lang="fr-FR" dirty="0" smtClean="0">
+                <a:hlinkClick r:id="rId4"/>
+              </a:rPr>
+              <a:t>$/var2/</a:t>
+            </a:r>
+            <a:endParaRPr lang="fr-FR" dirty="0" smtClean="0"/>
+          </a:p>
+          <a:p>
+            <a:r>
+              <a:rPr lang="fr-FR" dirty="0" smtClean="0">
+                <a:hlinkClick r:id="rId4"/>
+              </a:rPr>
+              <a:t>$/var2/</a:t>
+            </a:r>
+            <a:endParaRPr lang="fr-FR" dirty="0" smtClean="0"/>
+          </a:p>
+          <a:p>
+            <a:endParaRPr lang="fr-FR" dirty="0" smtClean="0"/>
+          </a:p>
+          <a:p>
+            <a:r>
+              <a:rPr lang="fr-FR" dirty="0" smtClean="0"/>
+              <a:t>Text3</a:t>
+            </a:r>
+          </a:p>
         </p:txBody>
       </p:sp>
       <p:sp>
         <p:nvSpPr>
           <p:cNvPr id="8" name="Ellipse 7">
-            <a:hlinkClick r:id="rId7"/>
+            <a:hlinkClick r:id="rId8"/>
           </p:cNvPr>
           <p:cNvSpPr/>
           <p:nvPr/>
@@ -3453,13 +3546,13 @@
           <a:p>
             <a:r>
               <a:rPr lang="fr-FR" sz="1000" dirty="0" smtClean="0">
-                <a:hlinkClick r:id="rId8"/>
+                <a:hlinkClick r:id="rId9"/>
               </a:rPr>
               <a:t>To style </a:t>
             </a:r>
             <a:r>
               <a:rPr lang="fr-FR" sz="1000" dirty="0" err="1" smtClean="0">
-                <a:hlinkClick r:id="rId8"/>
+                <a:hlinkClick r:id="rId9"/>
               </a:rPr>
               <a:t>text</a:t>
             </a:r>
@@ -3470,7 +3563,7 @@
       <p:sp>
         <p:nvSpPr>
           <p:cNvPr id="13" name="Rectangle 12">
-            <a:hlinkClick r:id="rId9"/>
+            <a:hlinkClick r:id="rId10"/>
           </p:cNvPr>
           <p:cNvSpPr/>
           <p:nvPr/>

</xml_diff>

<commit_message>
Simplify variable argument format
</commit_message>
<xml_diff>
--- a/demo/src/main/resources/template.pptx
+++ b/demo/src/main/resources/template.pptx
@@ -289,7 +289,7 @@
             <a:fld id="{3FD446A4-B7F7-4EA6-B2D1-ED8943CD3043}" type="datetimeFigureOut">
               <a:rPr lang="fr-FR" smtClean="0"/>
               <a:pPr/>
-              <a:t>19/12/2016</a:t>
+              <a:t>23/12/2016</a:t>
             </a:fld>
             <a:endParaRPr lang="fr-FR"/>
           </a:p>
@@ -456,7 +456,7 @@
             <a:fld id="{3FD446A4-B7F7-4EA6-B2D1-ED8943CD3043}" type="datetimeFigureOut">
               <a:rPr lang="fr-FR" smtClean="0"/>
               <a:pPr/>
-              <a:t>19/12/2016</a:t>
+              <a:t>23/12/2016</a:t>
             </a:fld>
             <a:endParaRPr lang="fr-FR"/>
           </a:p>
@@ -633,7 +633,7 @@
             <a:fld id="{3FD446A4-B7F7-4EA6-B2D1-ED8943CD3043}" type="datetimeFigureOut">
               <a:rPr lang="fr-FR" smtClean="0"/>
               <a:pPr/>
-              <a:t>19/12/2016</a:t>
+              <a:t>23/12/2016</a:t>
             </a:fld>
             <a:endParaRPr lang="fr-FR"/>
           </a:p>
@@ -800,7 +800,7 @@
             <a:fld id="{3FD446A4-B7F7-4EA6-B2D1-ED8943CD3043}" type="datetimeFigureOut">
               <a:rPr lang="fr-FR" smtClean="0"/>
               <a:pPr/>
-              <a:t>19/12/2016</a:t>
+              <a:t>23/12/2016</a:t>
             </a:fld>
             <a:endParaRPr lang="fr-FR"/>
           </a:p>
@@ -1043,7 +1043,7 @@
             <a:fld id="{3FD446A4-B7F7-4EA6-B2D1-ED8943CD3043}" type="datetimeFigureOut">
               <a:rPr lang="fr-FR" smtClean="0"/>
               <a:pPr/>
-              <a:t>19/12/2016</a:t>
+              <a:t>23/12/2016</a:t>
             </a:fld>
             <a:endParaRPr lang="fr-FR"/>
           </a:p>
@@ -1328,7 +1328,7 @@
             <a:fld id="{3FD446A4-B7F7-4EA6-B2D1-ED8943CD3043}" type="datetimeFigureOut">
               <a:rPr lang="fr-FR" smtClean="0"/>
               <a:pPr/>
-              <a:t>19/12/2016</a:t>
+              <a:t>23/12/2016</a:t>
             </a:fld>
             <a:endParaRPr lang="fr-FR"/>
           </a:p>
@@ -1747,7 +1747,7 @@
             <a:fld id="{3FD446A4-B7F7-4EA6-B2D1-ED8943CD3043}" type="datetimeFigureOut">
               <a:rPr lang="fr-FR" smtClean="0"/>
               <a:pPr/>
-              <a:t>19/12/2016</a:t>
+              <a:t>23/12/2016</a:t>
             </a:fld>
             <a:endParaRPr lang="fr-FR"/>
           </a:p>
@@ -1862,7 +1862,7 @@
             <a:fld id="{3FD446A4-B7F7-4EA6-B2D1-ED8943CD3043}" type="datetimeFigureOut">
               <a:rPr lang="fr-FR" smtClean="0"/>
               <a:pPr/>
-              <a:t>19/12/2016</a:t>
+              <a:t>23/12/2016</a:t>
             </a:fld>
             <a:endParaRPr lang="fr-FR"/>
           </a:p>
@@ -1954,7 +1954,7 @@
             <a:fld id="{3FD446A4-B7F7-4EA6-B2D1-ED8943CD3043}" type="datetimeFigureOut">
               <a:rPr lang="fr-FR" smtClean="0"/>
               <a:pPr/>
-              <a:t>19/12/2016</a:t>
+              <a:t>23/12/2016</a:t>
             </a:fld>
             <a:endParaRPr lang="fr-FR"/>
           </a:p>
@@ -2228,7 +2228,7 @@
             <a:fld id="{3FD446A4-B7F7-4EA6-B2D1-ED8943CD3043}" type="datetimeFigureOut">
               <a:rPr lang="fr-FR" smtClean="0"/>
               <a:pPr/>
-              <a:t>19/12/2016</a:t>
+              <a:t>23/12/2016</a:t>
             </a:fld>
             <a:endParaRPr lang="fr-FR"/>
           </a:p>
@@ -2478,7 +2478,7 @@
             <a:fld id="{3FD446A4-B7F7-4EA6-B2D1-ED8943CD3043}" type="datetimeFigureOut">
               <a:rPr lang="fr-FR" smtClean="0"/>
               <a:pPr/>
-              <a:t>19/12/2016</a:t>
+              <a:t>23/12/2016</a:t>
             </a:fld>
             <a:endParaRPr lang="fr-FR"/>
           </a:p>
@@ -2688,7 +2688,7 @@
             <a:fld id="{3FD446A4-B7F7-4EA6-B2D1-ED8943CD3043}" type="datetimeFigureOut">
               <a:rPr lang="fr-FR" smtClean="0"/>
               <a:pPr/>
-              <a:t>19/12/2016</a:t>
+              <a:t>23/12/2016</a:t>
             </a:fld>
             <a:endParaRPr lang="fr-FR"/>
           </a:p>
@@ -3090,7 +3090,7 @@
       <p:pic>
         <p:nvPicPr>
           <p:cNvPr id="1027" name="Picture 3" descr="D:\workspaces\unibail_turan\ppt-template\src\test\resources\images\350x150.png">
-            <a:hlinkClick r:id="rId4" action="ppaction://hlinkfile"/>
+            <a:hlinkClick r:id="rId4"/>
           </p:cNvPr>
           <p:cNvPicPr>
             <a:picLocks noChangeAspect="1" noChangeArrowheads="1"/>

</xml_diff>